<commit_message>
aulas de design patterns
</commit_message>
<xml_diff>
--- a/aulas/gsi526/aula15-padroes-de-projeto.pptx
+++ b/aulas/gsi526/aula15-padroes-de-projeto.pptx
@@ -10038,7 +10038,19 @@
             </a:r>
             <a:r>
               <a:rPr lang="en" sz="3200" b="1" dirty="0"/>
-              <a:t>de Projeto</a:t>
+              <a:t>de </a:t>
+            </a:r>
+            <a:r>
+              <a:rPr lang="en" sz="3200" b="1" dirty="0" smtClean="0"/>
+              <a:t>Projeto (</a:t>
+            </a:r>
+            <a:r>
+              <a:rPr lang="en" sz="3200" b="1" i="1" dirty="0" smtClean="0"/>
+              <a:t>Design Patterns</a:t>
+            </a:r>
+            <a:r>
+              <a:rPr lang="en" sz="3200" b="1" dirty="0" smtClean="0"/>
+              <a:t>)</a:t>
             </a:r>
             <a:endParaRPr sz="3200" b="1" dirty="0"/>
           </a:p>

</xml_diff>